<commit_message>
bug fix de ficha técnica
</commit_message>
<xml_diff>
--- a/visitas_stg/static/ppt/fichaTecnica_sisef.pptx
+++ b/visitas_stg/static/ppt/fichaTecnica_sisef.pptx
@@ -225,7 +225,7 @@
           <a:p>
             <a:fld id="{A12F159B-2BA9-4A4C-8F37-6A12CA4521B5}" type="datetimeFigureOut">
               <a:rPr lang="es-MX" smtClean="0"/>
-              <a:t>24/10/2015</a:t>
+              <a:t>28/10/2015</a:t>
             </a:fld>
             <a:endParaRPr lang="es-MX"/>
           </a:p>
@@ -390,7 +390,7 @@
           <a:p>
             <a:fld id="{E725DF0C-0434-4166-AFB2-E9FB5C8C5747}" type="datetimeFigureOut">
               <a:rPr lang="es-MX" smtClean="0"/>
-              <a:t>24/10/2015</a:t>
+              <a:t>28/10/2015</a:t>
             </a:fld>
             <a:endParaRPr lang="es-MX"/>
           </a:p>
@@ -853,7 +853,7 @@
           <a:p>
             <a:fld id="{F4C741E7-0659-46B3-91BB-B8C3B98C4B5D}" type="datetimeFigureOut">
               <a:rPr lang="es-MX" smtClean="0"/>
-              <a:t>24/10/2015</a:t>
+              <a:t>28/10/2015</a:t>
             </a:fld>
             <a:endParaRPr lang="es-MX"/>
           </a:p>
@@ -1070,7 +1070,7 @@
           <a:p>
             <a:fld id="{F4C741E7-0659-46B3-91BB-B8C3B98C4B5D}" type="datetimeFigureOut">
               <a:rPr lang="es-MX" smtClean="0"/>
-              <a:t>24/10/2015</a:t>
+              <a:t>28/10/2015</a:t>
             </a:fld>
             <a:endParaRPr lang="es-MX"/>
           </a:p>
@@ -1280,7 +1280,7 @@
           <a:p>
             <a:fld id="{F4C741E7-0659-46B3-91BB-B8C3B98C4B5D}" type="datetimeFigureOut">
               <a:rPr lang="es-MX" smtClean="0"/>
-              <a:t>24/10/2015</a:t>
+              <a:t>28/10/2015</a:t>
             </a:fld>
             <a:endParaRPr lang="es-MX"/>
           </a:p>
@@ -1490,7 +1490,7 @@
           <a:p>
             <a:fld id="{F4C741E7-0659-46B3-91BB-B8C3B98C4B5D}" type="datetimeFigureOut">
               <a:rPr lang="es-MX" smtClean="0"/>
-              <a:t>24/10/2015</a:t>
+              <a:t>28/10/2015</a:t>
             </a:fld>
             <a:endParaRPr lang="es-MX"/>
           </a:p>
@@ -1766,7 +1766,7 @@
           <a:p>
             <a:fld id="{F4C741E7-0659-46B3-91BB-B8C3B98C4B5D}" type="datetimeFigureOut">
               <a:rPr lang="es-MX" smtClean="0"/>
-              <a:t>24/10/2015</a:t>
+              <a:t>28/10/2015</a:t>
             </a:fld>
             <a:endParaRPr lang="es-MX"/>
           </a:p>
@@ -2092,7 +2092,7 @@
           <a:p>
             <a:fld id="{F4C741E7-0659-46B3-91BB-B8C3B98C4B5D}" type="datetimeFigureOut">
               <a:rPr lang="es-MX" smtClean="0"/>
-              <a:t>24/10/2015</a:t>
+              <a:t>28/10/2015</a:t>
             </a:fld>
             <a:endParaRPr lang="es-MX"/>
           </a:p>
@@ -2558,7 +2558,7 @@
           <a:p>
             <a:fld id="{F4C741E7-0659-46B3-91BB-B8C3B98C4B5D}" type="datetimeFigureOut">
               <a:rPr lang="es-MX" smtClean="0"/>
-              <a:t>24/10/2015</a:t>
+              <a:t>28/10/2015</a:t>
             </a:fld>
             <a:endParaRPr lang="es-MX"/>
           </a:p>
@@ -2708,7 +2708,7 @@
           <a:p>
             <a:fld id="{F4C741E7-0659-46B3-91BB-B8C3B98C4B5D}" type="datetimeFigureOut">
               <a:rPr lang="es-MX" smtClean="0"/>
-              <a:t>24/10/2015</a:t>
+              <a:t>28/10/2015</a:t>
             </a:fld>
             <a:endParaRPr lang="es-MX"/>
           </a:p>
@@ -2827,7 +2827,7 @@
           <a:p>
             <a:fld id="{F4C741E7-0659-46B3-91BB-B8C3B98C4B5D}" type="datetimeFigureOut">
               <a:rPr lang="es-MX" smtClean="0"/>
-              <a:t>24/10/2015</a:t>
+              <a:t>28/10/2015</a:t>
             </a:fld>
             <a:endParaRPr lang="es-MX"/>
           </a:p>
@@ -3137,7 +3137,7 @@
           <a:p>
             <a:fld id="{F4C741E7-0659-46B3-91BB-B8C3B98C4B5D}" type="datetimeFigureOut">
               <a:rPr lang="es-MX" smtClean="0"/>
-              <a:t>24/10/2015</a:t>
+              <a:t>28/10/2015</a:t>
             </a:fld>
             <a:endParaRPr lang="es-MX"/>
           </a:p>
@@ -3423,7 +3423,7 @@
           <a:p>
             <a:fld id="{F4C741E7-0659-46B3-91BB-B8C3B98C4B5D}" type="datetimeFigureOut">
               <a:rPr lang="es-MX" smtClean="0"/>
-              <a:t>24/10/2015</a:t>
+              <a:t>28/10/2015</a:t>
             </a:fld>
             <a:endParaRPr lang="es-MX"/>
           </a:p>
@@ -3991,7 +3991,7 @@
         <p:spPr>
           <a:xfrm>
             <a:off x="221690" y="2207790"/>
-            <a:ext cx="8712968" cy="4032448"/>
+            <a:ext cx="8712968" cy="4461570"/>
           </a:xfrm>
           <a:prstGeom prst="rect">
             <a:avLst/>
@@ -5194,11 +5194,6 @@
               </a:rPr>
               <a:t>x</a:t>
             </a:r>
-            <a:endParaRPr lang="es-MX" sz="800" b="1" dirty="0">
-              <a:latin typeface="Verdana" panose="020B0604030504040204" pitchFamily="34" charset="0"/>
-              <a:ea typeface="Verdana" panose="020B0604030504040204" pitchFamily="34" charset="0"/>
-              <a:cs typeface="Verdana" panose="020B0604030504040204" pitchFamily="34" charset="0"/>
-            </a:endParaRPr>
           </a:p>
         </p:txBody>
       </p:sp>
@@ -5286,8 +5281,8 @@
         </p:nvSpPr>
         <p:spPr>
           <a:xfrm>
-            <a:off x="3635895" y="2387753"/>
-            <a:ext cx="1872208" cy="261610"/>
+            <a:off x="3615672" y="2172046"/>
+            <a:ext cx="2468495" cy="246221"/>
           </a:xfrm>
           <a:prstGeom prst="rect">
             <a:avLst/>
@@ -5302,7 +5297,7 @@
           <a:p>
             <a:pPr algn="ctr"/>
             <a:r>
-              <a:rPr lang="es-MX" sz="1100" b="1" dirty="0" smtClean="0">
+              <a:rPr lang="es-MX" sz="1000" b="1" dirty="0" smtClean="0">
                 <a:latin typeface="Verdana" panose="020B0604030504040204" pitchFamily="34" charset="0"/>
                 <a:ea typeface="Verdana" panose="020B0604030504040204" pitchFamily="34" charset="0"/>
                 <a:cs typeface="Verdana" panose="020B0604030504040204" pitchFamily="34" charset="0"/>
@@ -5310,14 +5305,14 @@
               <a:t>Registro de </a:t>
             </a:r>
             <a:r>
-              <a:rPr lang="es-MX" sz="1100" b="1" dirty="0" smtClean="0">
+              <a:rPr lang="es-MX" sz="1000" b="1" dirty="0" smtClean="0">
                 <a:latin typeface="Verdana" panose="020B0604030504040204" pitchFamily="34" charset="0"/>
                 <a:ea typeface="Verdana" panose="020B0604030504040204" pitchFamily="34" charset="0"/>
                 <a:cs typeface="Verdana" panose="020B0604030504040204" pitchFamily="34" charset="0"/>
               </a:rPr>
-              <a:t>Visitas</a:t>
-            </a:r>
-            <a:endParaRPr lang="es-MX" sz="1100" b="1" dirty="0">
+              <a:t>Actividades</a:t>
+            </a:r>
+            <a:endParaRPr lang="es-MX" sz="1000" b="1" dirty="0">
               <a:latin typeface="Verdana" panose="020B0604030504040204" pitchFamily="34" charset="0"/>
               <a:ea typeface="Verdana" panose="020B0604030504040204" pitchFamily="34" charset="0"/>
               <a:cs typeface="Verdana" panose="020B0604030504040204" pitchFamily="34" charset="0"/>
@@ -5334,13 +5329,13 @@
           <p:nvPr>
             <p:extLst>
               <p:ext uri="{D42A27DB-BD31-4B8C-83A1-F6EECF244321}">
-                <p14:modId xmlns:p14="http://schemas.microsoft.com/office/powerpoint/2010/main" val="290545431"/>
+                <p14:modId xmlns:p14="http://schemas.microsoft.com/office/powerpoint/2010/main" val="2055701658"/>
               </p:ext>
             </p:extLst>
           </p:nvPr>
         </p:nvGraphicFramePr>
         <p:xfrm>
-          <a:off x="260634" y="2916230"/>
+          <a:off x="278096" y="3407400"/>
           <a:ext cx="8614384" cy="1533768"/>
         </p:xfrm>
         <a:graphic>
@@ -5544,7 +5539,7 @@
                   </a:txBody>
                   <a:tcPr/>
                 </a:tc>
-                <a:tc>
+                <a:tc rowSpan="3">
                   <a:txBody>
                     <a:bodyPr/>
                     <a:lstStyle/>
@@ -5634,7 +5629,7 @@
                   </a:txBody>
                   <a:tcPr/>
                 </a:tc>
-                <a:tc rowSpan="2">
+                <a:tc vMerge="1">
                   <a:txBody>
                     <a:bodyPr/>
                     <a:lstStyle/>
@@ -5739,7 +5734,7 @@
         </p:nvSpPr>
         <p:spPr>
           <a:xfrm>
-            <a:off x="797616" y="3552806"/>
+            <a:off x="815078" y="4043976"/>
             <a:ext cx="1452486" cy="230832"/>
           </a:xfrm>
           <a:prstGeom prst="rect">
@@ -5761,11 +5756,6 @@
               </a:rPr>
               <a:t>x</a:t>
             </a:r>
-            <a:endParaRPr lang="es-MX" sz="900" b="1" dirty="0">
-              <a:latin typeface="Verdana" panose="020B0604030504040204" pitchFamily="34" charset="0"/>
-              <a:ea typeface="Verdana" panose="020B0604030504040204" pitchFamily="34" charset="0"/>
-              <a:cs typeface="Verdana" panose="020B0604030504040204" pitchFamily="34" charset="0"/>
-            </a:endParaRPr>
           </a:p>
         </p:txBody>
       </p:sp>
@@ -5777,7 +5767,7 @@
         </p:nvSpPr>
         <p:spPr>
           <a:xfrm>
-            <a:off x="659762" y="3983465"/>
+            <a:off x="677224" y="4474635"/>
             <a:ext cx="1590340" cy="230832"/>
           </a:xfrm>
           <a:prstGeom prst="rect">
@@ -5815,7 +5805,7 @@
         </p:nvSpPr>
         <p:spPr>
           <a:xfrm>
-            <a:off x="2480656" y="3556480"/>
+            <a:off x="2498118" y="4047650"/>
             <a:ext cx="2040344" cy="215444"/>
           </a:xfrm>
           <a:prstGeom prst="rect">
@@ -5853,7 +5843,7 @@
         </p:nvSpPr>
         <p:spPr>
           <a:xfrm>
-            <a:off x="5007013" y="3171746"/>
+            <a:off x="5024475" y="3662916"/>
             <a:ext cx="1437196" cy="230832"/>
           </a:xfrm>
           <a:prstGeom prst="rect">
@@ -5868,12 +5858,12 @@
           <a:lstStyle/>
           <a:p>
             <a:r>
-              <a:rPr lang="es-MX" sz="900" b="1" dirty="0" smtClean="0">
+              <a:rPr lang="es-MX" sz="900" b="1" smtClean="0">
                 <a:latin typeface="Verdana" panose="020B0604030504040204" pitchFamily="34" charset="0"/>
                 <a:ea typeface="Verdana" panose="020B0604030504040204" pitchFamily="34" charset="0"/>
                 <a:cs typeface="Verdana" panose="020B0604030504040204" pitchFamily="34" charset="0"/>
               </a:rPr>
-              <a:t>Periódico</a:t>
+              <a:t>x</a:t>
             </a:r>
             <a:endParaRPr lang="es-MX" sz="900" b="1" dirty="0">
               <a:latin typeface="Verdana" panose="020B0604030504040204" pitchFamily="34" charset="0"/>
@@ -5891,7 +5881,7 @@
         </p:nvSpPr>
         <p:spPr>
           <a:xfrm>
-            <a:off x="6742551" y="3170605"/>
+            <a:off x="6760013" y="3661775"/>
             <a:ext cx="1501857" cy="230832"/>
           </a:xfrm>
           <a:prstGeom prst="rect">
@@ -5929,7 +5919,7 @@
         </p:nvSpPr>
         <p:spPr>
           <a:xfrm>
-            <a:off x="4572000" y="3711574"/>
+            <a:off x="4589462" y="4202744"/>
             <a:ext cx="1728192" cy="230832"/>
           </a:xfrm>
           <a:prstGeom prst="rect">
@@ -5951,11 +5941,6 @@
               </a:rPr>
               <a:t>x</a:t>
             </a:r>
-            <a:endParaRPr lang="es-MX" sz="900" b="1" dirty="0">
-              <a:latin typeface="Verdana" panose="020B0604030504040204" pitchFamily="34" charset="0"/>
-              <a:ea typeface="Verdana" panose="020B0604030504040204" pitchFamily="34" charset="0"/>
-              <a:cs typeface="Verdana" panose="020B0604030504040204" pitchFamily="34" charset="0"/>
-            </a:endParaRPr>
           </a:p>
         </p:txBody>
       </p:sp>
@@ -5967,7 +5952,7 @@
         </p:nvSpPr>
         <p:spPr>
           <a:xfrm>
-            <a:off x="7884368" y="3534896"/>
+            <a:off x="7901830" y="4026066"/>
             <a:ext cx="504056" cy="230832"/>
           </a:xfrm>
           <a:prstGeom prst="rect">
@@ -5989,7 +5974,116 @@
               </a:rPr>
               <a:t>x</a:t>
             </a:r>
-            <a:endParaRPr lang="es-MX" sz="900" b="1" dirty="0">
+          </a:p>
+        </p:txBody>
+      </p:sp>
+      <p:sp>
+        <p:nvSpPr>
+          <p:cNvPr id="28" name="13 CuadroTexto"/>
+          <p:cNvSpPr txBox="1"/>
+          <p:nvPr/>
+        </p:nvSpPr>
+        <p:spPr>
+          <a:xfrm>
+            <a:off x="1163854" y="2386595"/>
+            <a:ext cx="1334264" cy="215444"/>
+          </a:xfrm>
+          <a:prstGeom prst="rect">
+            <a:avLst/>
+          </a:prstGeom>
+          <a:noFill/>
+        </p:spPr>
+        <p:txBody>
+          <a:bodyPr wrap="square" rtlCol="0">
+            <a:spAutoFit/>
+          </a:bodyPr>
+          <a:lstStyle/>
+          <a:p>
+            <a:r>
+              <a:rPr lang="es-MX" sz="800" b="1" dirty="0" smtClean="0">
+                <a:latin typeface="Verdana" panose="020B0604030504040204" pitchFamily="34" charset="0"/>
+                <a:ea typeface="Verdana" panose="020B0604030504040204" pitchFamily="34" charset="0"/>
+                <a:cs typeface="Verdana" panose="020B0604030504040204" pitchFamily="34" charset="0"/>
+              </a:rPr>
+              <a:t>x</a:t>
+            </a:r>
+            <a:endParaRPr lang="es-MX" sz="800" b="1" dirty="0">
+              <a:latin typeface="Verdana" panose="020B0604030504040204" pitchFamily="34" charset="0"/>
+              <a:ea typeface="Verdana" panose="020B0604030504040204" pitchFamily="34" charset="0"/>
+              <a:cs typeface="Verdana" panose="020B0604030504040204" pitchFamily="34" charset="0"/>
+            </a:endParaRPr>
+          </a:p>
+        </p:txBody>
+      </p:sp>
+      <p:sp>
+        <p:nvSpPr>
+          <p:cNvPr id="30" name="13 CuadroTexto"/>
+          <p:cNvSpPr txBox="1"/>
+          <p:nvPr/>
+        </p:nvSpPr>
+        <p:spPr>
+          <a:xfrm>
+            <a:off x="3196292" y="2386766"/>
+            <a:ext cx="5662675" cy="215444"/>
+          </a:xfrm>
+          <a:prstGeom prst="rect">
+            <a:avLst/>
+          </a:prstGeom>
+          <a:noFill/>
+        </p:spPr>
+        <p:txBody>
+          <a:bodyPr wrap="square" rtlCol="0">
+            <a:spAutoFit/>
+          </a:bodyPr>
+          <a:lstStyle/>
+          <a:p>
+            <a:r>
+              <a:rPr lang="es-MX" sz="800" b="1" dirty="0" smtClean="0">
+                <a:latin typeface="Verdana" panose="020B0604030504040204" pitchFamily="34" charset="0"/>
+                <a:ea typeface="Verdana" panose="020B0604030504040204" pitchFamily="34" charset="0"/>
+                <a:cs typeface="Verdana" panose="020B0604030504040204" pitchFamily="34" charset="0"/>
+              </a:rPr>
+              <a:t>x</a:t>
+            </a:r>
+            <a:endParaRPr lang="es-MX" sz="800" b="1" dirty="0">
+              <a:latin typeface="Verdana" panose="020B0604030504040204" pitchFamily="34" charset="0"/>
+              <a:ea typeface="Verdana" panose="020B0604030504040204" pitchFamily="34" charset="0"/>
+              <a:cs typeface="Verdana" panose="020B0604030504040204" pitchFamily="34" charset="0"/>
+            </a:endParaRPr>
+          </a:p>
+        </p:txBody>
+      </p:sp>
+      <p:sp>
+        <p:nvSpPr>
+          <p:cNvPr id="29" name="13 CuadroTexto"/>
+          <p:cNvSpPr txBox="1"/>
+          <p:nvPr/>
+        </p:nvSpPr>
+        <p:spPr>
+          <a:xfrm>
+            <a:off x="1066530" y="2609413"/>
+            <a:ext cx="1140548" cy="215444"/>
+          </a:xfrm>
+          <a:prstGeom prst="rect">
+            <a:avLst/>
+          </a:prstGeom>
+          <a:noFill/>
+        </p:spPr>
+        <p:txBody>
+          <a:bodyPr wrap="square" rtlCol="0">
+            <a:spAutoFit/>
+          </a:bodyPr>
+          <a:lstStyle/>
+          <a:p>
+            <a:r>
+              <a:rPr lang="es-MX" sz="800" b="1" dirty="0" smtClean="0">
+                <a:latin typeface="Verdana" panose="020B0604030504040204" pitchFamily="34" charset="0"/>
+                <a:ea typeface="Verdana" panose="020B0604030504040204" pitchFamily="34" charset="0"/>
+                <a:cs typeface="Verdana" panose="020B0604030504040204" pitchFamily="34" charset="0"/>
+              </a:rPr>
+              <a:t>x</a:t>
+            </a:r>
+            <a:endParaRPr lang="es-MX" sz="800" b="1" dirty="0">
               <a:latin typeface="Verdana" panose="020B0604030504040204" pitchFamily="34" charset="0"/>
               <a:ea typeface="Verdana" panose="020B0604030504040204" pitchFamily="34" charset="0"/>
               <a:cs typeface="Verdana" panose="020B0604030504040204" pitchFamily="34" charset="0"/>
@@ -6006,13 +6100,13 @@
           <p:nvPr>
             <p:extLst>
               <p:ext uri="{D42A27DB-BD31-4B8C-83A1-F6EECF244321}">
-                <p14:modId xmlns:p14="http://schemas.microsoft.com/office/powerpoint/2010/main" val="2561154885"/>
+                <p14:modId xmlns:p14="http://schemas.microsoft.com/office/powerpoint/2010/main" val="2525813028"/>
               </p:ext>
             </p:extLst>
           </p:nvPr>
         </p:nvGraphicFramePr>
         <p:xfrm>
-          <a:off x="244585" y="4533588"/>
+          <a:off x="278096" y="5068664"/>
           <a:ext cx="8614384" cy="1533768"/>
         </p:xfrm>
         <a:graphic>
@@ -6216,7 +6310,7 @@
                   </a:txBody>
                   <a:tcPr/>
                 </a:tc>
-                <a:tc>
+                <a:tc rowSpan="3">
                   <a:txBody>
                     <a:bodyPr/>
                     <a:lstStyle/>
@@ -6306,7 +6400,7 @@
                   </a:txBody>
                   <a:tcPr/>
                 </a:tc>
-                <a:tc rowSpan="2">
+                <a:tc vMerge="1">
                   <a:txBody>
                     <a:bodyPr/>
                     <a:lstStyle/>
@@ -6397,6 +6491,151 @@
                     </a:p>
                   </a:txBody>
                   <a:tcPr/>
+                </a:tc>
+              </a:tr>
+            </a:tbl>
+          </a:graphicData>
+        </a:graphic>
+      </p:graphicFrame>
+      <p:graphicFrame>
+        <p:nvGraphicFramePr>
+          <p:cNvPr id="5" name="Tabla 4"/>
+          <p:cNvGraphicFramePr>
+            <a:graphicFrameLocks noGrp="1"/>
+          </p:cNvGraphicFramePr>
+          <p:nvPr>
+            <p:extLst>
+              <p:ext uri="{D42A27DB-BD31-4B8C-83A1-F6EECF244321}">
+                <p14:modId xmlns:p14="http://schemas.microsoft.com/office/powerpoint/2010/main" val="1978660739"/>
+              </p:ext>
+            </p:extLst>
+          </p:nvPr>
+        </p:nvGraphicFramePr>
+        <p:xfrm>
+          <a:off x="295544" y="2386595"/>
+          <a:ext cx="8563424" cy="438262"/>
+        </p:xfrm>
+        <a:graphic>
+          <a:graphicData uri="http://schemas.openxmlformats.org/drawingml/2006/table">
+            <a:tbl>
+              <a:tblPr firstRow="1" bandRow="1">
+                <a:tableStyleId>{5C22544A-7EE6-4342-B048-85BDC9FD1C3A}</a:tableStyleId>
+              </a:tblPr>
+              <a:tblGrid>
+                <a:gridCol w="2188224"/>
+                <a:gridCol w="6375200"/>
+              </a:tblGrid>
+              <a:tr h="224531">
+                <a:tc>
+                  <a:txBody>
+                    <a:bodyPr/>
+                    <a:lstStyle/>
+                    <a:p>
+                      <a:r>
+                        <a:rPr lang="es-MX" sz="800" b="0" dirty="0" smtClean="0">
+                          <a:solidFill>
+                            <a:schemeClr val="tx1"/>
+                          </a:solidFill>
+                          <a:latin typeface="Verdana" panose="020B0604030504040204" pitchFamily="34" charset="0"/>
+                          <a:ea typeface="Verdana" panose="020B0604030504040204" pitchFamily="34" charset="0"/>
+                          <a:cs typeface="Verdana" panose="020B0604030504040204" pitchFamily="34" charset="0"/>
+                        </a:rPr>
+                        <a:t>Tipo Actividad :</a:t>
+                      </a:r>
+                      <a:endParaRPr lang="es-MX" sz="800" b="0" dirty="0">
+                        <a:solidFill>
+                          <a:schemeClr val="tx1"/>
+                        </a:solidFill>
+                        <a:latin typeface="Verdana" panose="020B0604030504040204" pitchFamily="34" charset="0"/>
+                        <a:ea typeface="Verdana" panose="020B0604030504040204" pitchFamily="34" charset="0"/>
+                        <a:cs typeface="Verdana" panose="020B0604030504040204" pitchFamily="34" charset="0"/>
+                      </a:endParaRPr>
+                    </a:p>
+                  </a:txBody>
+                  <a:tcPr>
+                    <a:noFill/>
+                  </a:tcPr>
+                </a:tc>
+                <a:tc>
+                  <a:txBody>
+                    <a:bodyPr/>
+                    <a:lstStyle/>
+                    <a:p>
+                      <a:r>
+                        <a:rPr lang="es-MX" sz="800" b="0" dirty="0" smtClean="0">
+                          <a:solidFill>
+                            <a:schemeClr val="tx1"/>
+                          </a:solidFill>
+                          <a:latin typeface="Verdana" panose="020B0604030504040204" pitchFamily="34" charset="0"/>
+                          <a:ea typeface="Verdana" panose="020B0604030504040204" pitchFamily="34" charset="0"/>
+                          <a:cs typeface="Verdana" panose="020B0604030504040204" pitchFamily="34" charset="0"/>
+                        </a:rPr>
+                        <a:t>Descripción:</a:t>
+                      </a:r>
+                      <a:endParaRPr lang="es-MX" sz="800" b="0" dirty="0">
+                        <a:solidFill>
+                          <a:schemeClr val="tx1"/>
+                        </a:solidFill>
+                        <a:latin typeface="Verdana" panose="020B0604030504040204" pitchFamily="34" charset="0"/>
+                        <a:ea typeface="Verdana" panose="020B0604030504040204" pitchFamily="34" charset="0"/>
+                        <a:cs typeface="Verdana" panose="020B0604030504040204" pitchFamily="34" charset="0"/>
+                      </a:endParaRPr>
+                    </a:p>
+                  </a:txBody>
+                  <a:tcPr>
+                    <a:noFill/>
+                  </a:tcPr>
+                </a:tc>
+              </a:tr>
+              <a:tr h="213731">
+                <a:tc>
+                  <a:txBody>
+                    <a:bodyPr/>
+                    <a:lstStyle/>
+                    <a:p>
+                      <a:r>
+                        <a:rPr lang="es-MX" sz="800" b="0" dirty="0" smtClean="0">
+                          <a:solidFill>
+                            <a:schemeClr val="tx1"/>
+                          </a:solidFill>
+                          <a:latin typeface="Verdana" panose="020B0604030504040204" pitchFamily="34" charset="0"/>
+                          <a:ea typeface="Verdana" panose="020B0604030504040204" pitchFamily="34" charset="0"/>
+                          <a:cs typeface="Verdana" panose="020B0604030504040204" pitchFamily="34" charset="0"/>
+                        </a:rPr>
+                        <a:t>Clasificación: </a:t>
+                      </a:r>
+                      <a:endParaRPr lang="es-MX" sz="800" b="0" dirty="0">
+                        <a:solidFill>
+                          <a:schemeClr val="tx1"/>
+                        </a:solidFill>
+                        <a:latin typeface="Verdana" panose="020B0604030504040204" pitchFamily="34" charset="0"/>
+                        <a:ea typeface="Verdana" panose="020B0604030504040204" pitchFamily="34" charset="0"/>
+                        <a:cs typeface="Verdana" panose="020B0604030504040204" pitchFamily="34" charset="0"/>
+                      </a:endParaRPr>
+                    </a:p>
+                  </a:txBody>
+                  <a:tcPr>
+                    <a:noFill/>
+                  </a:tcPr>
+                </a:tc>
+                <a:tc>
+                  <a:txBody>
+                    <a:bodyPr/>
+                    <a:lstStyle/>
+                    <a:p>
+                      <a:endParaRPr lang="es-MX" sz="800" b="0" dirty="0">
+                        <a:solidFill>
+                          <a:schemeClr val="tx1"/>
+                        </a:solidFill>
+                        <a:latin typeface="Verdana" panose="020B0604030504040204" pitchFamily="34" charset="0"/>
+                        <a:ea typeface="Verdana" panose="020B0604030504040204" pitchFamily="34" charset="0"/>
+                        <a:cs typeface="Verdana" panose="020B0604030504040204" pitchFamily="34" charset="0"/>
+                      </a:endParaRPr>
+                    </a:p>
+                  </a:txBody>
+                  <a:tcPr>
+                    <a:noFill/>
+                  </a:tcPr>
                 </a:tc>
               </a:tr>
             </a:tbl>

</xml_diff>